<commit_message>
Tuesday end of day
</commit_message>
<xml_diff>
--- a/_site/slides/week00/lecture.pptx
+++ b/_site/slides/week00/lecture.pptx
@@ -15,6 +15,13 @@
     <p:sldId id="263" r:id="rId9"/>
     <p:sldId id="264" r:id="rId10"/>
     <p:sldId id="265" r:id="rId11"/>
+    <p:sldId id="266" r:id="rId12"/>
+    <p:sldId id="267" r:id="rId13"/>
+    <p:sldId id="268" r:id="rId14"/>
+    <p:sldId id="269" r:id="rId15"/>
+    <p:sldId id="270" r:id="rId16"/>
+    <p:sldId id="271" r:id="rId17"/>
+    <p:sldId id="272" r:id="rId18"/>
   </p:sldIdLst>
   <p:sldSz cx="12192000" cy="6858000"/>
   <p:notesSz cx="6858000" cy="9144000"/>
@@ -5029,7 +5036,7 @@
             </a:pPr>
             <a:r>
               <a:rPr/>
-              <a:t>Thank you</a:t>
+              <a:t>A friendly warning</a:t>
             </a:r>
           </a:p>
         </p:txBody>
@@ -5055,17 +5062,805 @@
           <a:bodyPr/>
           <a:lstStyle/>
           <a:p>
+            <a:pPr lvl="0" indent="0" marL="1270000">
+              <a:buNone/>
+            </a:pPr>
+            <a:r>
+              <a:rPr sz="2000" b="1"/>
+              <a:t>Warning</a:t>
+            </a:r>
+          </a:p>
+          <a:p>
+            <a:pPr lvl="0" indent="0" marL="1270000">
+              <a:buNone/>
+            </a:pPr>
+            <a:r>
+              <a:rPr sz="2000"/>
+              <a:t>All coursework is INDIVIDUAL and subject to normal plagiarism and collusion rules</a:t>
+            </a:r>
+          </a:p>
+        </p:txBody>
+      </p:sp>
+    </p:spTree>
+  </p:cSld>
+</p:sld>
+</file>
+
+<file path=ppt/slides/slide11.xml><?xml version="1.0" encoding="utf-8"?>
+<p:sld xmlns:a="http://schemas.openxmlformats.org/drawingml/2006/main" xmlns:r="http://schemas.openxmlformats.org/officeDocument/2006/relationships" xmlns:p="http://schemas.openxmlformats.org/presentationml/2006/main">
+  <p:cSld>
+    <p:spTree>
+      <p:nvGrpSpPr>
+        <p:cNvPr id="1" name=""/>
+        <p:cNvGrpSpPr/>
+        <p:nvPr/>
+      </p:nvGrpSpPr>
+      <p:grpSpPr>
+        <a:xfrm>
+          <a:off x="0" y="0"/>
+          <a:ext cx="0" cy="0"/>
+          <a:chOff x="0" y="0"/>
+          <a:chExt cx="0" cy="0"/>
+        </a:xfrm>
+      </p:grpSpPr>
+      <p:sp>
+        <p:nvSpPr>
+          <p:cNvPr id="2" name="Title 1">
+            <a:extLst>
+              <a:ext uri="{FF2B5EF4-FFF2-40B4-BE49-F238E27FC236}">
+                <a16:creationId xmlns:a16="http://schemas.microsoft.com/office/drawing/2014/main" id="{DD9B8E45-0772-954C-8D4B-6E6808DFEDED}"/>
+              </a:ext>
+            </a:extLst>
+          </p:cNvPr>
+          <p:cNvSpPr>
+            <a:spLocks noGrp="1"/>
+          </p:cNvSpPr>
+          <p:nvPr>
+            <p:ph type="title"/>
+          </p:nvPr>
+        </p:nvSpPr>
+        <p:spPr>
+          <a:xfrm>
+            <a:off x="838200" y="365129"/>
+            <a:ext cx="10002520" cy="1325563"/>
+          </a:xfrm>
+          <a:prstGeom prst="rect">
+            <a:avLst/>
+          </a:prstGeom>
+        </p:spPr>
+        <p:txBody>
+          <a:bodyPr/>
+          <a:lstStyle/>
+          <a:p>
             <a:pPr lvl="0" indent="0" marL="0">
-              <a:spcBef>
-                <a:spcPts val="3000"/>
-              </a:spcBef>
               <a:buNone/>
             </a:pPr>
             <a:r>
+              <a:rPr/>
+              <a:t>Module structure</a:t>
+            </a:r>
+          </a:p>
+        </p:txBody>
+      </p:sp>
+      <p:sp>
+        <p:nvSpPr>
+          <p:cNvPr id="3" name="Content Placeholder 2">
+            <a:extLst>
+              <a:ext uri="{FF2B5EF4-FFF2-40B4-BE49-F238E27FC236}">
+                <a16:creationId xmlns:a16="http://schemas.microsoft.com/office/drawing/2014/main" id="{A4EB24F9-04F1-C843-9D71-56C5C024552B}"/>
+              </a:ext>
+            </a:extLst>
+          </p:cNvPr>
+          <p:cNvSpPr>
+            <a:spLocks noGrp="1"/>
+          </p:cNvSpPr>
+          <p:nvPr>
+            <p:ph idx="1"/>
+          </p:nvPr>
+        </p:nvSpPr>
+        <p:spPr/>
+        <p:txBody>
+          <a:bodyPr/>
+          <a:lstStyle/>
+          <a:p>
+            <a:pPr lvl="0" indent="0" marL="0">
+              <a:buNone/>
+            </a:pPr>
+            <a:r>
+              <a:rPr/>
+              <a:t>1 x 1 hr Lecture per week (Monday)</a:t>
+            </a:r>
+          </a:p>
+          <a:p>
+            <a:pPr lvl="0" indent="0" marL="0">
+              <a:buNone/>
+            </a:pPr>
+            <a:r>
+              <a:rPr/>
+              <a:t>1 x 2 hr Lab per week (Tuesday)</a:t>
+            </a:r>
+          </a:p>
+          <a:p>
+            <a:pPr lvl="0" indent="0" marL="0">
+              <a:buNone/>
+            </a:pPr>
+            <a:r>
+              <a:rPr/>
+              <a:t>4 x Personal Tutor meetings across the year</a:t>
+            </a:r>
+          </a:p>
+        </p:txBody>
+      </p:sp>
+    </p:spTree>
+  </p:cSld>
+</p:sld>
+</file>
+
+<file path=ppt/slides/slide12.xml><?xml version="1.0" encoding="utf-8"?>
+<p:sld xmlns:a="http://schemas.openxmlformats.org/drawingml/2006/main" xmlns:r="http://schemas.openxmlformats.org/officeDocument/2006/relationships" xmlns:p="http://schemas.openxmlformats.org/presentationml/2006/main">
+  <p:cSld>
+    <p:spTree>
+      <p:nvGrpSpPr>
+        <p:cNvPr id="1" name=""/>
+        <p:cNvGrpSpPr/>
+        <p:nvPr/>
+      </p:nvGrpSpPr>
+      <p:grpSpPr>
+        <a:xfrm>
+          <a:off x="0" y="0"/>
+          <a:ext cx="0" cy="0"/>
+          <a:chOff x="0" y="0"/>
+          <a:chExt cx="0" cy="0"/>
+        </a:xfrm>
+      </p:grpSpPr>
+      <p:sp>
+        <p:nvSpPr>
+          <p:cNvPr id="2" name="Title 1">
+            <a:extLst>
+              <a:ext uri="{FF2B5EF4-FFF2-40B4-BE49-F238E27FC236}">
+                <a16:creationId xmlns:a16="http://schemas.microsoft.com/office/drawing/2014/main" id="{DD9B8E45-0772-954C-8D4B-6E6808DFEDED}"/>
+              </a:ext>
+            </a:extLst>
+          </p:cNvPr>
+          <p:cNvSpPr>
+            <a:spLocks noGrp="1"/>
+          </p:cNvSpPr>
+          <p:nvPr>
+            <p:ph type="title"/>
+          </p:nvPr>
+        </p:nvSpPr>
+        <p:spPr>
+          <a:xfrm>
+            <a:off x="838200" y="365129"/>
+            <a:ext cx="10002520" cy="1325563"/>
+          </a:xfrm>
+          <a:prstGeom prst="rect">
+            <a:avLst/>
+          </a:prstGeom>
+        </p:spPr>
+        <p:txBody>
+          <a:bodyPr/>
+          <a:lstStyle/>
+          <a:p>
+            <a:pPr lvl="0" indent="0" marL="0">
+              <a:buNone/>
+            </a:pPr>
+            <a:r>
+              <a:rPr/>
+              <a:t>Weekly Structure</a:t>
+            </a:r>
+          </a:p>
+        </p:txBody>
+      </p:sp>
+      <p:sp>
+        <p:nvSpPr>
+          <p:cNvPr id="3" name="Content Placeholder 2">
+            <a:extLst>
+              <a:ext uri="{FF2B5EF4-FFF2-40B4-BE49-F238E27FC236}">
+                <a16:creationId xmlns:a16="http://schemas.microsoft.com/office/drawing/2014/main" id="{A4EB24F9-04F1-C843-9D71-56C5C024552B}"/>
+              </a:ext>
+            </a:extLst>
+          </p:cNvPr>
+          <p:cNvSpPr>
+            <a:spLocks noGrp="1"/>
+          </p:cNvSpPr>
+          <p:nvPr>
+            <p:ph idx="1"/>
+          </p:nvPr>
+        </p:nvSpPr>
+        <p:spPr/>
+        <p:txBody>
+          <a:bodyPr/>
+          <a:lstStyle/>
+          <a:p>
+            <a:pPr lvl="0" indent="0" marL="0">
+              <a:buNone/>
+            </a:pPr>
+            <a:r>
+              <a:rPr/>
+              <a:t>Each week there will be a very brief ‘</a:t>
+            </a:r>
+            <a:r>
               <a:rPr b="1"/>
+              <a:t>Prelude</a:t>
+            </a:r>
+            <a:r>
+              <a:rPr/>
+              <a:t>’ designed to introduce one of the main topics of the week</a:t>
+            </a:r>
+          </a:p>
+          <a:p>
+            <a:pPr lvl="0" indent="0" marL="0">
+              <a:buNone/>
+            </a:pPr>
+            <a:r>
+              <a:rPr b="1"/>
+              <a:t>Lecture</a:t>
+            </a:r>
+            <a:r>
+              <a:rPr/>
+              <a:t> (slides and recording posted afterwards)</a:t>
+            </a:r>
+          </a:p>
+          <a:p>
+            <a:pPr lvl="0" indent="0" marL="0">
+              <a:buNone/>
+            </a:pPr>
+            <a:r>
+              <a:rPr b="1"/>
+              <a:t>Lab Activity</a:t>
+            </a:r>
+          </a:p>
+          <a:p>
+            <a:pPr lvl="0"/>
+            <a:r>
+              <a:rPr b="1"/>
+              <a:t>‘Pulse’</a:t>
+            </a:r>
+            <a:r>
+              <a:rPr/>
+              <a:t> taken on entry - 2 minute quiz</a:t>
+            </a:r>
+          </a:p>
+          <a:p>
+            <a:pPr lvl="0"/>
+            <a:r>
+              <a:rPr b="1"/>
+              <a:t>Lab Notebook</a:t>
+            </a:r>
+            <a:r>
+              <a:rPr/>
+              <a:t> with brief ‘generative activities’ and opportunities for metacognitive reflection</a:t>
+            </a:r>
+          </a:p>
+          <a:p>
+            <a:pPr lvl="0"/>
+            <a:r>
+              <a:rPr/>
+              <a:t>Extras provided around skills or applications or just interesting factoids</a:t>
+            </a:r>
+          </a:p>
+          <a:p>
+            <a:pPr lvl="0"/>
+            <a:r>
+              <a:rPr/>
+              <a:t>Lots can be achieved in the labs, but independent study and coordinated group work will be required</a:t>
+            </a:r>
+          </a:p>
+          <a:p>
+            <a:pPr lvl="0" indent="0" marL="0">
+              <a:buNone/>
+            </a:pPr>
+            <a:r>
+              <a:rPr/>
+              <a:t>NO EXAM</a:t>
+            </a:r>
+          </a:p>
+        </p:txBody>
+      </p:sp>
+    </p:spTree>
+  </p:cSld>
+</p:sld>
+</file>
+
+<file path=ppt/slides/slide13.xml><?xml version="1.0" encoding="utf-8"?>
+<p:sld xmlns:a="http://schemas.openxmlformats.org/drawingml/2006/main" xmlns:r="http://schemas.openxmlformats.org/officeDocument/2006/relationships" xmlns:p="http://schemas.openxmlformats.org/presentationml/2006/main">
+  <p:cSld>
+    <p:spTree>
+      <p:nvGrpSpPr>
+        <p:cNvPr id="1" name=""/>
+        <p:cNvGrpSpPr/>
+        <p:nvPr/>
+      </p:nvGrpSpPr>
+      <p:grpSpPr>
+        <a:xfrm>
+          <a:off x="0" y="0"/>
+          <a:ext cx="0" cy="0"/>
+          <a:chOff x="0" y="0"/>
+          <a:chExt cx="0" cy="0"/>
+        </a:xfrm>
+      </p:grpSpPr>
+      <p:sp>
+        <p:nvSpPr>
+          <p:cNvPr id="2" name="Title 1">
+            <a:extLst>
+              <a:ext uri="{FF2B5EF4-FFF2-40B4-BE49-F238E27FC236}">
+                <a16:creationId xmlns:a16="http://schemas.microsoft.com/office/drawing/2014/main" id="{DD9B8E45-0772-954C-8D4B-6E6808DFEDED}"/>
+              </a:ext>
+            </a:extLst>
+          </p:cNvPr>
+          <p:cNvSpPr>
+            <a:spLocks noGrp="1"/>
+          </p:cNvSpPr>
+          <p:nvPr>
+            <p:ph type="title"/>
+          </p:nvPr>
+        </p:nvSpPr>
+        <p:spPr>
+          <a:xfrm>
+            <a:off x="838200" y="365129"/>
+            <a:ext cx="10002520" cy="1325563"/>
+          </a:xfrm>
+          <a:prstGeom prst="rect">
+            <a:avLst/>
+          </a:prstGeom>
+        </p:spPr>
+        <p:txBody>
+          <a:bodyPr/>
+          <a:lstStyle/>
+          <a:p>
+            <a:pPr lvl="0" indent="0" marL="0">
+              <a:buNone/>
+            </a:pPr>
+            <a:r>
+              <a:rPr/>
+              <a:t>Coursework</a:t>
+            </a:r>
+          </a:p>
+        </p:txBody>
+      </p:sp>
+      <p:sp>
+        <p:nvSpPr>
+          <p:cNvPr id="3" name="Content Placeholder 2">
+            <a:extLst>
+              <a:ext uri="{FF2B5EF4-FFF2-40B4-BE49-F238E27FC236}">
+                <a16:creationId xmlns:a16="http://schemas.microsoft.com/office/drawing/2014/main" id="{A4EB24F9-04F1-C843-9D71-56C5C024552B}"/>
+              </a:ext>
+            </a:extLst>
+          </p:cNvPr>
+          <p:cNvSpPr>
+            <a:spLocks noGrp="1"/>
+          </p:cNvSpPr>
+          <p:nvPr>
+            <p:ph idx="1"/>
+          </p:nvPr>
+        </p:nvSpPr>
+        <p:spPr/>
+        <p:txBody>
+          <a:bodyPr/>
+          <a:lstStyle/>
+          <a:p>
+            <a:pPr lvl="0" indent="0" marL="0">
+              <a:buNone/>
+            </a:pPr>
+            <a:r>
+              <a:rPr/>
+              <a:t>The courseworks ALL require critical reflection and metacognitive practice. This will be discussed in a number of lectures, but it contributes to effective learning and your integration of the skills and experience of doing this research exercise.</a:t>
+            </a:r>
+          </a:p>
+        </p:txBody>
+      </p:sp>
+    </p:spTree>
+  </p:cSld>
+</p:sld>
+</file>
+
+<file path=ppt/slides/slide14.xml><?xml version="1.0" encoding="utf-8"?>
+<p:sld xmlns:a="http://schemas.openxmlformats.org/drawingml/2006/main" xmlns:r="http://schemas.openxmlformats.org/officeDocument/2006/relationships" xmlns:p="http://schemas.openxmlformats.org/presentationml/2006/main">
+  <p:cSld>
+    <p:spTree>
+      <p:nvGrpSpPr>
+        <p:cNvPr id="1" name=""/>
+        <p:cNvGrpSpPr/>
+        <p:nvPr/>
+      </p:nvGrpSpPr>
+      <p:grpSpPr>
+        <a:xfrm>
+          <a:off x="0" y="0"/>
+          <a:ext cx="0" cy="0"/>
+          <a:chOff x="0" y="0"/>
+          <a:chExt cx="0" cy="0"/>
+        </a:xfrm>
+      </p:grpSpPr>
+      <p:sp>
+        <p:nvSpPr>
+          <p:cNvPr id="2" name="Title 1">
+            <a:extLst>
+              <a:ext uri="{FF2B5EF4-FFF2-40B4-BE49-F238E27FC236}">
+                <a16:creationId xmlns:a16="http://schemas.microsoft.com/office/drawing/2014/main" id="{DD9B8E45-0772-954C-8D4B-6E6808DFEDED}"/>
+              </a:ext>
+            </a:extLst>
+          </p:cNvPr>
+          <p:cNvSpPr>
+            <a:spLocks noGrp="1"/>
+          </p:cNvSpPr>
+          <p:nvPr>
+            <p:ph type="title"/>
+          </p:nvPr>
+        </p:nvSpPr>
+        <p:spPr>
+          <a:xfrm>
+            <a:off x="838200" y="365129"/>
+            <a:ext cx="10002520" cy="1325563"/>
+          </a:xfrm>
+          <a:prstGeom prst="rect">
+            <a:avLst/>
+          </a:prstGeom>
+        </p:spPr>
+        <p:txBody>
+          <a:bodyPr/>
+          <a:lstStyle/>
+          <a:p>
+            <a:pPr lvl="0" indent="0" marL="0">
+              <a:buNone/>
+            </a:pPr>
+            <a:r>
+              <a:rPr/>
+              <a:t>Time management and teamwork</a:t>
+            </a:r>
+          </a:p>
+        </p:txBody>
+      </p:sp>
+      <p:sp>
+        <p:nvSpPr>
+          <p:cNvPr id="3" name="Content Placeholder 2">
+            <a:extLst>
+              <a:ext uri="{FF2B5EF4-FFF2-40B4-BE49-F238E27FC236}">
+                <a16:creationId xmlns:a16="http://schemas.microsoft.com/office/drawing/2014/main" id="{A4EB24F9-04F1-C843-9D71-56C5C024552B}"/>
+              </a:ext>
+            </a:extLst>
+          </p:cNvPr>
+          <p:cNvSpPr>
+            <a:spLocks noGrp="1"/>
+          </p:cNvSpPr>
+          <p:nvPr>
+            <p:ph idx="1"/>
+          </p:nvPr>
+        </p:nvSpPr>
+        <p:spPr/>
+        <p:txBody>
+          <a:bodyPr/>
+          <a:lstStyle/>
+          <a:p>
+            <a:pPr lvl="0" indent="0" marL="0">
+              <a:buNone/>
+            </a:pPr>
+            <a:r>
+              <a:rPr/>
+              <a:t>..will both be required.</a:t>
+            </a:r>
+          </a:p>
+          <a:p>
+            <a:pPr lvl="0" indent="0" marL="0">
+              <a:buNone/>
+            </a:pPr>
+            <a:r>
+              <a:rPr/>
+              <a:t>I ask you to see both as an opportunity to develop these important skills.</a:t>
+            </a:r>
+          </a:p>
+          <a:p>
+            <a:pPr lvl="0" indent="0" marL="0">
+              <a:buNone/>
+            </a:pPr>
+            <a:r>
+              <a:rPr/>
+              <a:t>You will see we have some ideas to make this more relevant to careers and employability</a:t>
+            </a:r>
+          </a:p>
+          <a:p>
+            <a:pPr lvl="0" indent="0" marL="0">
+              <a:buNone/>
+            </a:pPr>
+            <a:r>
+              <a:rPr/>
+              <a:t>It is easier to ‘keep up than to catch up’.</a:t>
+            </a:r>
+          </a:p>
+        </p:txBody>
+      </p:sp>
+    </p:spTree>
+  </p:cSld>
+</p:sld>
+</file>
+
+<file path=ppt/slides/slide15.xml><?xml version="1.0" encoding="utf-8"?>
+<p:sld xmlns:a="http://schemas.openxmlformats.org/drawingml/2006/main" xmlns:r="http://schemas.openxmlformats.org/officeDocument/2006/relationships" xmlns:p="http://schemas.openxmlformats.org/presentationml/2006/main">
+  <p:cSld>
+    <p:spTree>
+      <p:nvGrpSpPr>
+        <p:cNvPr id="1" name=""/>
+        <p:cNvGrpSpPr/>
+        <p:nvPr/>
+      </p:nvGrpSpPr>
+      <p:grpSpPr>
+        <a:xfrm>
+          <a:off x="0" y="0"/>
+          <a:ext cx="0" cy="0"/>
+          <a:chOff x="0" y="0"/>
+          <a:chExt cx="0" cy="0"/>
+        </a:xfrm>
+      </p:grpSpPr>
+      <p:sp>
+        <p:nvSpPr>
+          <p:cNvPr id="2" name="Title 1">
+            <a:extLst>
+              <a:ext uri="{FF2B5EF4-FFF2-40B4-BE49-F238E27FC236}">
+                <a16:creationId xmlns:a16="http://schemas.microsoft.com/office/drawing/2014/main" id="{DD9B8E45-0772-954C-8D4B-6E6808DFEDED}"/>
+              </a:ext>
+            </a:extLst>
+          </p:cNvPr>
+          <p:cNvSpPr>
+            <a:spLocks noGrp="1"/>
+          </p:cNvSpPr>
+          <p:nvPr>
+            <p:ph type="title"/>
+          </p:nvPr>
+        </p:nvSpPr>
+        <p:spPr>
+          <a:xfrm>
+            <a:off x="838200" y="365129"/>
+            <a:ext cx="10002520" cy="1325563"/>
+          </a:xfrm>
+          <a:prstGeom prst="rect">
+            <a:avLst/>
+          </a:prstGeom>
+        </p:spPr>
+        <p:txBody>
+          <a:bodyPr/>
+          <a:lstStyle/>
+          <a:p>
+            <a:pPr lvl="0" indent="0" marL="0">
+              <a:buNone/>
+            </a:pPr>
+            <a:r>
+              <a:rPr/>
+              <a:t>Resources</a:t>
+            </a:r>
+          </a:p>
+        </p:txBody>
+      </p:sp>
+      <p:sp>
+        <p:nvSpPr>
+          <p:cNvPr id="3" name="Content Placeholder 2">
+            <a:extLst>
+              <a:ext uri="{FF2B5EF4-FFF2-40B4-BE49-F238E27FC236}">
+                <a16:creationId xmlns:a16="http://schemas.microsoft.com/office/drawing/2014/main" id="{A4EB24F9-04F1-C843-9D71-56C5C024552B}"/>
+              </a:ext>
+            </a:extLst>
+          </p:cNvPr>
+          <p:cNvSpPr>
+            <a:spLocks noGrp="1"/>
+          </p:cNvSpPr>
+          <p:nvPr>
+            <p:ph idx="1"/>
+          </p:nvPr>
+        </p:nvSpPr>
+        <p:spPr/>
+        <p:txBody>
+          <a:bodyPr/>
+          <a:lstStyle/>
+          <a:p>
+            <a:pPr lvl="0" indent="0" marL="0">
+              <a:buNone/>
+            </a:pPr>
+            <a:r>
+              <a:rPr/>
+              <a:t>We will be releasing a series of valuable resources to help you through every step of the process</a:t>
+            </a:r>
+          </a:p>
+          <a:p>
+            <a:pPr lvl="0" indent="0" marL="0">
+              <a:buNone/>
+            </a:pPr>
+            <a:r>
+              <a:rPr/>
+              <a:t>These will have value for your final year dissertation too.</a:t>
+            </a:r>
+          </a:p>
+          <a:p>
+            <a:pPr lvl="0" indent="0" marL="0">
+              <a:buNone/>
+            </a:pPr>
+            <a:r>
+              <a:rPr/>
+              <a:t>Contribution to and comment on these is welcome and hoped for!</a:t>
+            </a:r>
+          </a:p>
+          <a:p>
+            <a:pPr lvl="0" indent="0" marL="0">
+              <a:buNone/>
+            </a:pPr>
+            <a:r>
+              <a:rPr/>
+              <a:t>Open Educational Resources will be used extensively, and most core readings are available online via the library.</a:t>
+            </a:r>
+          </a:p>
+        </p:txBody>
+      </p:sp>
+    </p:spTree>
+  </p:cSld>
+</p:sld>
+</file>
+
+<file path=ppt/slides/slide16.xml><?xml version="1.0" encoding="utf-8"?>
+<p:sld xmlns:a="http://schemas.openxmlformats.org/drawingml/2006/main" xmlns:r="http://schemas.openxmlformats.org/officeDocument/2006/relationships" xmlns:p="http://schemas.openxmlformats.org/presentationml/2006/main">
+  <p:cSld>
+    <p:spTree>
+      <p:nvGrpSpPr>
+        <p:cNvPr id="1" name=""/>
+        <p:cNvGrpSpPr/>
+        <p:nvPr/>
+      </p:nvGrpSpPr>
+      <p:grpSpPr>
+        <a:xfrm>
+          <a:off x="0" y="0"/>
+          <a:ext cx="0" cy="0"/>
+          <a:chOff x="0" y="0"/>
+          <a:chExt cx="0" cy="0"/>
+        </a:xfrm>
+      </p:grpSpPr>
+      <p:sp>
+        <p:nvSpPr>
+          <p:cNvPr id="2" name="Title 1">
+            <a:extLst>
+              <a:ext uri="{FF2B5EF4-FFF2-40B4-BE49-F238E27FC236}">
+                <a16:creationId xmlns:a16="http://schemas.microsoft.com/office/drawing/2014/main" id="{DD9B8E45-0772-954C-8D4B-6E6808DFEDED}"/>
+              </a:ext>
+            </a:extLst>
+          </p:cNvPr>
+          <p:cNvSpPr>
+            <a:spLocks noGrp="1"/>
+          </p:cNvSpPr>
+          <p:nvPr>
+            <p:ph type="title"/>
+          </p:nvPr>
+        </p:nvSpPr>
+        <p:spPr>
+          <a:xfrm>
+            <a:off x="838200" y="365129"/>
+            <a:ext cx="10002520" cy="1325563"/>
+          </a:xfrm>
+          <a:prstGeom prst="rect">
+            <a:avLst/>
+          </a:prstGeom>
+        </p:spPr>
+        <p:txBody>
+          <a:bodyPr/>
+          <a:lstStyle/>
+          <a:p>
+            <a:pPr lvl="0" indent="0" marL="0">
+              <a:buNone/>
+            </a:pPr>
+            <a:r>
+              <a:rPr/>
+              <a:t>Prelude 1</a:t>
+            </a:r>
+          </a:p>
+        </p:txBody>
+      </p:sp>
+      <p:sp>
+        <p:nvSpPr>
+          <p:cNvPr id="3" name="Content Placeholder 2">
+            <a:extLst>
+              <a:ext uri="{FF2B5EF4-FFF2-40B4-BE49-F238E27FC236}">
+                <a16:creationId xmlns:a16="http://schemas.microsoft.com/office/drawing/2014/main" id="{A4EB24F9-04F1-C843-9D71-56C5C024552B}"/>
+              </a:ext>
+            </a:extLst>
+          </p:cNvPr>
+          <p:cNvSpPr>
+            <a:spLocks noGrp="1"/>
+          </p:cNvSpPr>
+          <p:nvPr>
+            <p:ph idx="1"/>
+          </p:nvPr>
+        </p:nvSpPr>
+        <p:spPr/>
+        <p:txBody>
+          <a:bodyPr/>
+          <a:lstStyle/>
+          <a:p>
+            <a:pPr lvl="0" indent="0" marL="0">
+              <a:buNone/>
+            </a:pPr>
+            <a:r>
+              <a:rPr/>
+              <a:t>We are starting off very easy. A short questionnaire to allow us to get to know you a little better, which we will use to develop the first lecture, and the course more generally.</a:t>
+            </a:r>
+          </a:p>
+        </p:txBody>
+      </p:sp>
+    </p:spTree>
+  </p:cSld>
+</p:sld>
+</file>
+
+<file path=ppt/slides/slide17.xml><?xml version="1.0" encoding="utf-8"?>
+<p:sld xmlns:a="http://schemas.openxmlformats.org/drawingml/2006/main" xmlns:r="http://schemas.openxmlformats.org/officeDocument/2006/relationships" xmlns:p="http://schemas.openxmlformats.org/presentationml/2006/main">
+  <p:cSld>
+    <p:spTree>
+      <p:nvGrpSpPr>
+        <p:cNvPr id="1" name=""/>
+        <p:cNvGrpSpPr/>
+        <p:nvPr/>
+      </p:nvGrpSpPr>
+      <p:grpSpPr>
+        <a:xfrm>
+          <a:off x="0" y="0"/>
+          <a:ext cx="0" cy="0"/>
+          <a:chOff x="0" y="0"/>
+          <a:chExt cx="0" cy="0"/>
+        </a:xfrm>
+      </p:grpSpPr>
+      <p:sp>
+        <p:nvSpPr>
+          <p:cNvPr id="2" name="Title 1">
+            <a:extLst>
+              <a:ext uri="{FF2B5EF4-FFF2-40B4-BE49-F238E27FC236}">
+                <a16:creationId xmlns:a16="http://schemas.microsoft.com/office/drawing/2014/main" id="{DD9B8E45-0772-954C-8D4B-6E6808DFEDED}"/>
+              </a:ext>
+            </a:extLst>
+          </p:cNvPr>
+          <p:cNvSpPr>
+            <a:spLocks noGrp="1"/>
+          </p:cNvSpPr>
+          <p:nvPr>
+            <p:ph type="title"/>
+          </p:nvPr>
+        </p:nvSpPr>
+        <p:spPr>
+          <a:xfrm>
+            <a:off x="838200" y="365129"/>
+            <a:ext cx="10002520" cy="1325563"/>
+          </a:xfrm>
+          <a:prstGeom prst="rect">
+            <a:avLst/>
+          </a:prstGeom>
+        </p:spPr>
+        <p:txBody>
+          <a:bodyPr/>
+          <a:lstStyle/>
+          <a:p>
+            <a:pPr lvl="0" indent="0" marL="0">
+              <a:buNone/>
+            </a:pPr>
+            <a:r>
+              <a:rPr/>
               <a:t>Thank you for your time</a:t>
             </a:r>
           </a:p>
+        </p:txBody>
+      </p:sp>
+      <p:sp>
+        <p:nvSpPr>
+          <p:cNvPr id="3" name="Content Placeholder 2">
+            <a:extLst>
+              <a:ext uri="{FF2B5EF4-FFF2-40B4-BE49-F238E27FC236}">
+                <a16:creationId xmlns:a16="http://schemas.microsoft.com/office/drawing/2014/main" id="{A4EB24F9-04F1-C843-9D71-56C5C024552B}"/>
+              </a:ext>
+            </a:extLst>
+          </p:cNvPr>
+          <p:cNvSpPr>
+            <a:spLocks noGrp="1"/>
+          </p:cNvSpPr>
+          <p:nvPr>
+            <p:ph idx="1"/>
+          </p:nvPr>
+        </p:nvSpPr>
+        <p:spPr/>
+        <p:txBody>
+          <a:bodyPr/>
+          <a:lstStyle/>
           <a:p>
             <a:pPr lvl="0" indent="0" marL="0">
               <a:buNone/>
@@ -5082,80 +5877,6 @@
             <a:r>
               <a:rPr/>
               <a:t>The Research Methods Team</a:t>
-            </a:r>
-          </a:p>
-          <a:p>
-            <a:pPr lvl="0" indent="0" marL="0">
-              <a:spcBef>
-                <a:spcPts val="3000"/>
-              </a:spcBef>
-              <a:buNone/>
-            </a:pPr>
-            <a:r>
-              <a:rPr b="1"/>
-              <a:t>References</a:t>
-            </a:r>
-          </a:p>
-          <a:p>
-            <a:pPr lvl="0" indent="0" marL="0">
-              <a:buNone/>
-            </a:pPr>
-            <a:r>
-              <a:rPr/>
-              <a:t>Cohen, J. (1992). A power primer. </a:t>
-            </a:r>
-            <a:r>
-              <a:rPr i="1"/>
-              <a:t>Psychological Bulletin</a:t>
-            </a:r>
-            <a:r>
-              <a:rPr/>
-              <a:t>, </a:t>
-            </a:r>
-            <a:r>
-              <a:rPr i="1"/>
-              <a:t>112</a:t>
-            </a:r>
-            <a:r>
-              <a:rPr/>
-              <a:t>, 155–155. </a:t>
-            </a:r>
-            <a:r>
-              <a:rPr>
-                <a:hlinkClick r:id="rId2"/>
-              </a:rPr>
-              <a:t>https://doi.org/10.1037/0033-2909.112.1.155</a:t>
-            </a:r>
-          </a:p>
-          <a:p>
-            <a:pPr lvl="0" indent="0" marL="0">
-              <a:buNone/>
-            </a:pPr>
-            <a:r>
-              <a:rPr/>
-              <a:t>Wright, G. R. T., Berry, C. J., &amp; Bird, G. (2012). “You can’t kid a kidder”: association between production and detection of deception in an interactive deception task. u1 - wright2012. </a:t>
-            </a:r>
-            <a:r>
-              <a:rPr i="1"/>
-              <a:t>Frontiers in Human Neuroscience</a:t>
-            </a:r>
-            <a:r>
-              <a:rPr/>
-              <a:t>, </a:t>
-            </a:r>
-            <a:r>
-              <a:rPr i="1"/>
-              <a:t>6</a:t>
-            </a:r>
-            <a:r>
-              <a:rPr/>
-              <a:t>, 87. </a:t>
-            </a:r>
-            <a:r>
-              <a:rPr>
-                <a:hlinkClick r:id="rId3"/>
-              </a:rPr>
-              <a:t>https://doi.org/10.3389/fnhum.2012.00087</a:t>
             </a:r>
           </a:p>
         </p:txBody>
@@ -5187,7 +5908,7 @@
           <p:cNvPr id="2" name="Title 1">
             <a:extLst>
               <a:ext uri="{FF2B5EF4-FFF2-40B4-BE49-F238E27FC236}">
-                <a16:creationId xmlns:a16="http://schemas.microsoft.com/office/drawing/2014/main" id="{DD9B8E45-0772-954C-8D4B-6E6808DFEDED}"/>
+                <a16:creationId xmlns:a16="http://schemas.microsoft.com/office/drawing/2014/main" id="{FF6A6CB2-D1B6-B94A-84C1-83C65423C650}"/>
               </a:ext>
             </a:extLst>
           </p:cNvPr>
@@ -5200,8 +5921,8 @@
         </p:nvSpPr>
         <p:spPr>
           <a:xfrm>
-            <a:off x="838200" y="365129"/>
-            <a:ext cx="10002520" cy="1325563"/>
+            <a:off x="831851" y="1709742"/>
+            <a:ext cx="10515600" cy="2852737"/>
           </a:xfrm>
           <a:prstGeom prst="rect">
             <a:avLst/>
@@ -5216,7 +5937,7 @@
             </a:pPr>
             <a:r>
               <a:rPr/>
-              <a:t>Show Attendance QR Code</a:t>
+              <a:t>Induction Overview</a:t>
             </a:r>
           </a:p>
         </p:txBody>
@@ -5277,71 +5998,7 @@
             </a:pPr>
             <a:r>
               <a:rPr/>
-              <a:t>Heading 1 - Section Head</a:t>
-            </a:r>
-          </a:p>
-        </p:txBody>
-      </p:sp>
-      <p:sp>
-        <p:nvSpPr>
-          <p:cNvPr id="3" name="Content Placeholder 2">
-            <a:extLst>
-              <a:ext uri="{FF2B5EF4-FFF2-40B4-BE49-F238E27FC236}">
-                <a16:creationId xmlns:a16="http://schemas.microsoft.com/office/drawing/2014/main" id="{A4EB24F9-04F1-C843-9D71-56C5C024552B}"/>
-              </a:ext>
-            </a:extLst>
-          </p:cNvPr>
-          <p:cNvSpPr>
-            <a:spLocks noGrp="1"/>
-          </p:cNvSpPr>
-          <p:nvPr>
-            <p:ph idx="1"/>
-          </p:nvPr>
-        </p:nvSpPr>
-        <p:spPr/>
-        <p:txBody>
-          <a:bodyPr/>
-          <a:lstStyle/>
-          <a:p>
-            <a:pPr lvl="0" indent="0" marL="0">
-              <a:buNone/>
-            </a:pPr>
-            <a:r>
-              <a:rPr/>
-              <a:t>This is a subtitle to the section header</a:t>
-            </a:r>
-          </a:p>
-          <a:p>
-            <a:pPr lvl="0" indent="0" marL="0">
-              <a:spcBef>
-                <a:spcPts val="3000"/>
-              </a:spcBef>
-              <a:buNone/>
-            </a:pPr>
-            <a:r>
-              <a:rPr b="1"/>
-              <a:t>Heading 2 - new slide title</a:t>
-            </a:r>
-          </a:p>
-          <a:p>
-            <a:pPr lvl="0" indent="0" marL="0">
-              <a:buNone/>
-            </a:pPr>
-            <a:r>
-              <a:rPr/>
-              <a:t>Heading 2 copy</a:t>
-            </a:r>
-          </a:p>
-          <a:p>
-            <a:pPr lvl="0" indent="0" marL="0">
-              <a:spcBef>
-                <a:spcPts val="3000"/>
-              </a:spcBef>
-              <a:buNone/>
-            </a:pPr>
-            <a:r>
-              <a:rPr b="1"/>
-              <a:t>Heading 3 - italic emphasis</a:t>
+              <a:t>Welcome back and welcome to Research Methods!</a:t>
             </a:r>
           </a:p>
         </p:txBody>
@@ -5402,7 +6059,7 @@
             </a:pPr>
             <a:r>
               <a:rPr/>
-              <a:t>2 Column</a:t>
+              <a:t>This year you become Scientists!</a:t>
             </a:r>
           </a:p>
         </p:txBody>
@@ -5429,14 +6086,76 @@
           <a:lstStyle/>
           <a:p>
             <a:pPr lvl="0" indent="0" marL="0">
-              <a:spcBef>
-                <a:spcPts val="3000"/>
-              </a:spcBef>
               <a:buNone/>
             </a:pPr>
             <a:r>
-              <a:rPr b="1"/>
-              <a:t>2 column here</a:t>
+              <a:rPr/>
+              <a:t>This year, in Research Methods, you will perform your first piece of REAL psychological research</a:t>
+            </a:r>
+          </a:p>
+          <a:p>
+            <a:pPr lvl="0" indent="0" marL="0">
+              <a:buNone/>
+            </a:pPr>
+            <a:r>
+              <a:rPr/>
+              <a:t>In groups, you will:</a:t>
+            </a:r>
+          </a:p>
+          <a:p>
+            <a:pPr lvl="0"/>
+            <a:r>
+              <a:rPr/>
+              <a:t>Identify an area of psychological research</a:t>
+            </a:r>
+          </a:p>
+          <a:p>
+            <a:pPr lvl="0"/>
+            <a:r>
+              <a:rPr/>
+              <a:t>Review and critique the literature in this area</a:t>
+            </a:r>
+          </a:p>
+          <a:p>
+            <a:pPr lvl="0"/>
+            <a:r>
+              <a:rPr/>
+              <a:t>Develop a testable hypothesis</a:t>
+            </a:r>
+          </a:p>
+          <a:p>
+            <a:pPr lvl="0"/>
+            <a:r>
+              <a:rPr/>
+              <a:t>Design a 2x2 ANOVA experiment unique to you (within your group study)</a:t>
+            </a:r>
+          </a:p>
+          <a:p>
+            <a:pPr lvl="0"/>
+            <a:r>
+              <a:rPr/>
+              <a:t>Obtain Ethical Approval for your experiment</a:t>
+            </a:r>
+          </a:p>
+          <a:p>
+            <a:pPr lvl="0"/>
+            <a:r>
+              <a:rPr/>
+              <a:t>Collect REAL data</a:t>
+            </a:r>
+          </a:p>
+          <a:p>
+            <a:pPr lvl="0"/>
+            <a:r>
+              <a:rPr/>
+              <a:t>Analyse these data</a:t>
+            </a:r>
+          </a:p>
+          <a:p>
+            <a:pPr lvl="0"/>
+            <a:r>
+              <a:rPr/>
+              <a:t>Write up the results in APA format</a:t>
             </a:r>
           </a:p>
         </p:txBody>
@@ -5465,18 +6184,57 @@
       </p:grpSpPr>
       <p:sp>
         <p:nvSpPr>
+          <p:cNvPr id="2" name="Title 1">
+            <a:extLst>
+              <a:ext uri="{FF2B5EF4-FFF2-40B4-BE49-F238E27FC236}">
+                <a16:creationId xmlns:a16="http://schemas.microsoft.com/office/drawing/2014/main" id="{DD9B8E45-0772-954C-8D4B-6E6808DFEDED}"/>
+              </a:ext>
+            </a:extLst>
+          </p:cNvPr>
+          <p:cNvSpPr>
+            <a:spLocks noGrp="1"/>
+          </p:cNvSpPr>
+          <p:nvPr>
+            <p:ph type="title"/>
+          </p:nvPr>
+        </p:nvSpPr>
+        <p:spPr>
+          <a:xfrm>
+            <a:off x="838200" y="365129"/>
+            <a:ext cx="10002520" cy="1325563"/>
+          </a:xfrm>
+          <a:prstGeom prst="rect">
+            <a:avLst/>
+          </a:prstGeom>
+        </p:spPr>
+        <p:txBody>
+          <a:bodyPr/>
+          <a:lstStyle/>
+          <a:p>
+            <a:pPr lvl="0" indent="0" marL="0">
+              <a:buNone/>
+            </a:pPr>
+            <a:r>
+              <a:rPr/>
+              <a:t>A full overview will be given in the first lecture!</a:t>
+            </a:r>
+          </a:p>
+        </p:txBody>
+      </p:sp>
+      <p:sp>
+        <p:nvSpPr>
           <p:cNvPr id="3" name="Content Placeholder 2">
             <a:extLst>
               <a:ext uri="{FF2B5EF4-FFF2-40B4-BE49-F238E27FC236}">
-                <a16:creationId xmlns:a16="http://schemas.microsoft.com/office/drawing/2014/main" id="{63FA7BF1-44B1-744C-AB68-4BB0A6A5977E}"/>
-              </a:ext>
-            </a:extLst>
-          </p:cNvPr>
-          <p:cNvSpPr>
-            <a:spLocks noGrp="1"/>
-          </p:cNvSpPr>
-          <p:nvPr>
-            <p:ph idx="1" sz="half"/>
+                <a16:creationId xmlns:a16="http://schemas.microsoft.com/office/drawing/2014/main" id="{A4EB24F9-04F1-C843-9D71-56C5C024552B}"/>
+              </a:ext>
+            </a:extLst>
+          </p:cNvPr>
+          <p:cNvSpPr>
+            <a:spLocks noGrp="1"/>
+          </p:cNvSpPr>
+          <p:nvPr>
+            <p:ph idx="1"/>
           </p:nvPr>
         </p:nvSpPr>
         <p:spPr/>
@@ -5489,65 +6247,7 @@
             </a:pPr>
             <a:r>
               <a:rPr/>
-              <a:t>Left Column</a:t>
-            </a:r>
-          </a:p>
-          <a:p>
-            <a:pPr lvl="0" indent="0" marL="0">
-              <a:buNone/>
-            </a:pPr>
-            <a:r>
-              <a:rPr/>
-              <a:t>again</a:t>
-            </a:r>
-          </a:p>
-          <a:p>
-            <a:pPr lvl="0" indent="0" marL="0">
-              <a:buNone/>
-            </a:pPr>
-            <a:r>
-              <a:rPr/>
-              <a:t>aesst</a:t>
-            </a:r>
-          </a:p>
-        </p:txBody>
-      </p:sp>
-      <p:sp>
-        <p:nvSpPr>
-          <p:cNvPr id="4" name="Content Placeholder 3">
-            <a:extLst>
-              <a:ext uri="{FF2B5EF4-FFF2-40B4-BE49-F238E27FC236}">
-                <a16:creationId xmlns:a16="http://schemas.microsoft.com/office/drawing/2014/main" id="{3B974A49-6A1E-2F48-B419-02B0A17B9692}"/>
-              </a:ext>
-            </a:extLst>
-          </p:cNvPr>
-          <p:cNvSpPr>
-            <a:spLocks noGrp="1"/>
-          </p:cNvSpPr>
-          <p:nvPr>
-            <p:ph idx="2" sz="half"/>
-          </p:nvPr>
-        </p:nvSpPr>
-        <p:spPr/>
-        <p:txBody>
-          <a:bodyPr/>
-          <a:lstStyle/>
-          <a:p>
-            <a:pPr lvl="0" indent="0" marL="0">
-              <a:buNone/>
-            </a:pPr>
-            <a:r>
-              <a:rPr/>
-              <a:t>Right columnn</a:t>
-            </a:r>
-          </a:p>
-          <a:p>
-            <a:pPr lvl="0" indent="0" marL="0">
-              <a:buNone/>
-            </a:pPr>
-            <a:r>
-              <a:rPr/>
-              <a:t>ahdn here is more</a:t>
+              <a:t>Do not worry! It’s going to be a great adventure!</a:t>
             </a:r>
           </a:p>
         </p:txBody>
@@ -5576,6 +6276,45 @@
       </p:grpSpPr>
       <p:sp>
         <p:nvSpPr>
+          <p:cNvPr id="2" name="Title 1">
+            <a:extLst>
+              <a:ext uri="{FF2B5EF4-FFF2-40B4-BE49-F238E27FC236}">
+                <a16:creationId xmlns:a16="http://schemas.microsoft.com/office/drawing/2014/main" id="{DD9B8E45-0772-954C-8D4B-6E6808DFEDED}"/>
+              </a:ext>
+            </a:extLst>
+          </p:cNvPr>
+          <p:cNvSpPr>
+            <a:spLocks noGrp="1"/>
+          </p:cNvSpPr>
+          <p:nvPr>
+            <p:ph type="title"/>
+          </p:nvPr>
+        </p:nvSpPr>
+        <p:spPr>
+          <a:xfrm>
+            <a:off x="838200" y="365129"/>
+            <a:ext cx="10002520" cy="1325563"/>
+          </a:xfrm>
+          <a:prstGeom prst="rect">
+            <a:avLst/>
+          </a:prstGeom>
+        </p:spPr>
+        <p:txBody>
+          <a:bodyPr/>
+          <a:lstStyle/>
+          <a:p>
+            <a:pPr lvl="0" indent="0" marL="0">
+              <a:buNone/>
+            </a:pPr>
+            <a:r>
+              <a:rPr/>
+              <a:t>A ‘warm up’ for your Y3 Dissertation</a:t>
+            </a:r>
+          </a:p>
+        </p:txBody>
+      </p:sp>
+      <p:sp>
+        <p:nvSpPr>
           <p:cNvPr id="3" name="Content Placeholder 2">
             <a:extLst>
               <a:ext uri="{FF2B5EF4-FFF2-40B4-BE49-F238E27FC236}">
@@ -5595,171 +6334,52 @@
           <a:bodyPr/>
           <a:lstStyle/>
           <a:p>
-            <a:pPr lvl="0" indent="0" marL="0">
-              <a:spcBef>
-                <a:spcPts val="3000"/>
-              </a:spcBef>
-              <a:buNone/>
-            </a:pPr>
-            <a:r>
-              <a:rPr b="1"/>
-              <a:t>Spans for text accentuation - available in source mode</a:t>
-            </a:r>
-          </a:p>
-          <a:p>
-            <a:pPr lvl="0" indent="0" marL="0">
-              <a:buNone/>
-            </a:pPr>
-            <a:r>
-              <a:rPr/>
-              <a:t>.shout accent3(red) 1.5em and Bold</a:t>
-            </a:r>
-          </a:p>
-          <a:p>
-            <a:pPr lvl="0" indent="0" marL="0">
-              <a:buNone/>
-            </a:pPr>
-            <a:r>
-              <a:rPr/>
-              <a:t>.alert accent3(red) no change to font size</a:t>
-            </a:r>
-          </a:p>
-          <a:p>
-            <a:pPr lvl="0" indent="0" marL="0">
-              <a:buNone/>
-            </a:pPr>
-            <a:r>
-              <a:rPr/>
-              <a:t>.fg .bg</a:t>
-            </a:r>
-          </a:p>
-          <a:p>
-            <a:pPr lvl="0" indent="0" marL="0">
-              <a:buNone/>
-            </a:pPr>
-            <a:r>
-              <a:rPr/>
-              <a:t>.button accent1 whitetext button for link</a:t>
-            </a:r>
-          </a:p>
-          <a:p>
-            <a:pPr lvl="0" indent="0" marL="0">
-              <a:buNone/>
-            </a:pPr>
-            <a:r>
-              <a:rPr/>
-              <a:t>.button-success</a:t>
-            </a:r>
-          </a:p>
-          <a:p>
-            <a:pPr lvl="0" indent="0" marL="0">
-              <a:buNone/>
-            </a:pPr>
-            <a:r>
-              <a:rPr/>
-              <a:t>.takeaway</a:t>
-            </a:r>
-          </a:p>
-          <a:p>
-            <a:pPr lvl="0" indent="0" marL="0">
-              <a:buNone/>
-            </a:pPr>
-            <a:r>
-              <a:rPr/>
-              <a:t>.highlight</a:t>
-            </a:r>
-          </a:p>
-          <a:p>
-            <a:pPr lvl="0" indent="0" marL="0">
-              <a:spcBef>
-                <a:spcPts val="3000"/>
-              </a:spcBef>
-              <a:buNone/>
-            </a:pPr>
-            <a:r>
-              <a:rPr b="1"/>
-              <a:t>Citations</a:t>
-            </a:r>
-          </a:p>
-          <a:p>
-            <a:pPr lvl="0" indent="0" marL="0">
-              <a:buNone/>
-            </a:pPr>
-            <a:r>
-              <a:rPr/>
-              <a:t>Wright et al. (2012)</a:t>
-            </a:r>
-          </a:p>
-          <a:p>
-            <a:pPr lvl="0" indent="0" marL="0">
-              <a:buNone/>
-            </a:pPr>
-            <a:r>
-              <a:rPr/>
-              <a:t>Cohen (1992) In text citation </a:t>
-            </a:r>
-            <a:r>
-              <a:rPr>
-                <a:latin typeface="Courier"/>
-              </a:rPr>
-              <a:t>@Cohen1992</a:t>
-            </a:r>
-          </a:p>
-          <a:p>
-            <a:pPr lvl="0" indent="0" marL="0">
-              <a:buNone/>
-            </a:pPr>
-            <a:r>
-              <a:rPr/>
-              <a:t>(Cohen, 1992) not in-text citation `(Cohen, 1992)</a:t>
-            </a:r>
-          </a:p>
-          <a:p>
-            <a:pPr lvl="0" indent="0" marL="0">
-              <a:buNone/>
-            </a:pPr>
-            <a:r>
-              <a:rPr/>
-              <a:t>just type `@` and a search box comes up for your Zotero library or a .bib file associated with the project</a:t>
-            </a:r>
-          </a:p>
-          <a:p>
-            <a:pPr lvl="0" indent="0" marL="0">
-              <a:spcBef>
-                <a:spcPts val="3000"/>
-              </a:spcBef>
-              <a:buNone/>
-            </a:pPr>
-            <a:r>
-              <a:rPr b="1"/>
-              <a:t>Image|content 2 column</a:t>
-            </a:r>
-          </a:p>
-          <a:p>
-            <a:pPr lvl="0" indent="0" marL="0">
-              <a:buNone/>
-            </a:pPr>
-            <a:r>
-              <a:rPr/>
-              <a:t>Slide with image and commentary in two columns and some explanatory text above</a:t>
-            </a:r>
-          </a:p>
-          <a:p>
-            <a:pPr lvl="0" indent="0" marL="0">
-              <a:buNone/>
-            </a:pPr>
-            <a:r>
-              <a:rPr/>
-              <a:t>text text text text text text text text text text text text</a:t>
-            </a:r>
-          </a:p>
-          <a:p>
-            <a:pPr lvl="0" indent="0" marL="0">
-              <a:buNone/>
-            </a:pPr>
-            <a:r>
-              <a:rPr/>
-              <a:t>text text text text text text text text text text text text</a:t>
+            <a:pPr lvl="0"/>
+            <a:r>
+              <a:rPr/>
+              <a:t>The same 20-week timeline</a:t>
+            </a:r>
+          </a:p>
+          <a:p>
+            <a:pPr lvl="0"/>
+            <a:r>
+              <a:rPr/>
+              <a:t>The same skills and techniques you will need</a:t>
+            </a:r>
+          </a:p>
+          <a:p>
+            <a:pPr lvl="0"/>
+            <a:r>
+              <a:rPr/>
+              <a:t>Careful step-by-step guidance and support in the lab setting</a:t>
+            </a:r>
+          </a:p>
+          <a:p>
+            <a:pPr lvl="0"/>
+            <a:r>
+              <a:rPr/>
+              <a:t>Scaled-down experiments and write-ups</a:t>
+            </a:r>
+          </a:p>
+          <a:p>
+            <a:pPr lvl="0"/>
+            <a:r>
+              <a:rPr/>
+              <a:t>The security of working in a group</a:t>
+            </a:r>
+          </a:p>
+          <a:p>
+            <a:pPr lvl="0"/>
+            <a:r>
+              <a:rPr/>
+              <a:t>Tips and advice from world-class researchers</a:t>
+            </a:r>
+          </a:p>
+          <a:p>
+            <a:pPr lvl="0"/>
+            <a:r>
+              <a:rPr/>
+              <a:t>Opportunity to think carefully about your final year Dissertation, and how to crush it!!</a:t>
             </a:r>
           </a:p>
         </p:txBody>
@@ -5786,50 +6406,59 @@
           <a:chExt cx="0" cy="0"/>
         </a:xfrm>
       </p:grpSpPr>
-      <p:pic>
-        <p:nvPicPr>
-          <p:cNvPr descr="images/TestImage.png" id="0" name="Picture 1"/>
-          <p:cNvPicPr>
-            <a:picLocks noGrp="1" noChangeAspect="1"/>
-          </p:cNvPicPr>
-          <p:nvPr/>
-        </p:nvPicPr>
-        <p:blipFill>
-          <a:blip r:embed="rId2"/>
-          <a:stretch>
-            <a:fillRect/>
-          </a:stretch>
-        </p:blipFill>
-        <p:spPr bwMode="auto">
+      <p:sp>
+        <p:nvSpPr>
+          <p:cNvPr id="2" name="Title 1">
+            <a:extLst>
+              <a:ext uri="{FF2B5EF4-FFF2-40B4-BE49-F238E27FC236}">
+                <a16:creationId xmlns:a16="http://schemas.microsoft.com/office/drawing/2014/main" id="{DD9B8E45-0772-954C-8D4B-6E6808DFEDED}"/>
+              </a:ext>
+            </a:extLst>
+          </p:cNvPr>
+          <p:cNvSpPr>
+            <a:spLocks noGrp="1"/>
+          </p:cNvSpPr>
+          <p:nvPr>
+            <p:ph type="title"/>
+          </p:nvPr>
+        </p:nvSpPr>
+        <p:spPr>
           <a:xfrm>
-            <a:off x="1257300" y="1816100"/>
-            <a:ext cx="4343400" cy="4343400"/>
+            <a:off x="838200" y="365129"/>
+            <a:ext cx="10002520" cy="1325563"/>
           </a:xfrm>
           <a:prstGeom prst="rect">
             <a:avLst/>
           </a:prstGeom>
-          <a:noFill/>
-          <a:ln w="9525">
-            <a:noFill/>
-            <a:headEnd/>
-            <a:tailEnd/>
-          </a:ln>
         </p:spPr>
-      </p:pic>
-      <p:sp>
-        <p:nvSpPr>
-          <p:cNvPr id="4" name="Content Placeholder 3">
-            <a:extLst>
-              <a:ext uri="{FF2B5EF4-FFF2-40B4-BE49-F238E27FC236}">
-                <a16:creationId xmlns:a16="http://schemas.microsoft.com/office/drawing/2014/main" id="{3B974A49-6A1E-2F48-B419-02B0A17B9692}"/>
-              </a:ext>
-            </a:extLst>
-          </p:cNvPr>
-          <p:cNvSpPr>
-            <a:spLocks noGrp="1"/>
-          </p:cNvSpPr>
-          <p:nvPr>
-            <p:ph idx="2" sz="half"/>
+        <p:txBody>
+          <a:bodyPr/>
+          <a:lstStyle/>
+          <a:p>
+            <a:pPr lvl="0" indent="0" marL="0">
+              <a:buNone/>
+            </a:pPr>
+            <a:r>
+              <a:rPr/>
+              <a:t>Support and guidance</a:t>
+            </a:r>
+          </a:p>
+        </p:txBody>
+      </p:sp>
+      <p:sp>
+        <p:nvSpPr>
+          <p:cNvPr id="3" name="Content Placeholder 2">
+            <a:extLst>
+              <a:ext uri="{FF2B5EF4-FFF2-40B4-BE49-F238E27FC236}">
+                <a16:creationId xmlns:a16="http://schemas.microsoft.com/office/drawing/2014/main" id="{A4EB24F9-04F1-C843-9D71-56C5C024552B}"/>
+              </a:ext>
+            </a:extLst>
+          </p:cNvPr>
+          <p:cNvSpPr>
+            <a:spLocks noGrp="1"/>
+          </p:cNvSpPr>
+          <p:nvPr>
+            <p:ph idx="1"/>
           </p:nvPr>
         </p:nvSpPr>
         <p:spPr/>
@@ -5837,33 +6466,40 @@
           <a:bodyPr/>
           <a:lstStyle/>
           <a:p>
+            <a:pPr lvl="0"/>
+            <a:r>
+              <a:rPr/>
+              <a:t>Gordon Wright (Module Coordinator and floating Enthusiast in Chief)</a:t>
+            </a:r>
+          </a:p>
+          <a:p>
+            <a:pPr lvl="0"/>
+            <a:r>
+              <a:rPr/>
+              <a:t>7 gobsmackingly amazing Lab Tutors</a:t>
+            </a:r>
+          </a:p>
+          <a:p>
+            <a:pPr lvl="0"/>
+            <a:r>
+              <a:rPr/>
+              <a:t>Your Personal Tutor and your PT group</a:t>
+            </a:r>
+          </a:p>
+          <a:p>
+            <a:pPr lvl="0"/>
+            <a:r>
+              <a:rPr/>
+              <a:t>AND EACH OTHER!!</a:t>
+            </a:r>
+          </a:p>
+          <a:p>
             <a:pPr lvl="0" indent="0" marL="0">
               <a:buNone/>
             </a:pPr>
             <a:r>
               <a:rPr/>
-              <a:t>Here is some text</a:t>
-            </a:r>
-          </a:p>
-          <a:p>
-            <a:pPr lvl="0"/>
-            <a:r>
-              <a:rPr/>
-              <a:t>Bullet 1</a:t>
-            </a:r>
-          </a:p>
-          <a:p>
-            <a:pPr lvl="0"/>
-            <a:r>
-              <a:rPr/>
-              <a:t>Bullet 2</a:t>
-            </a:r>
-          </a:p>
-          <a:p>
-            <a:pPr lvl="0"/>
-            <a:r>
-              <a:rPr/>
-              <a:t>Bullet 3</a:t>
+              <a:t>This is a team-sport</a:t>
             </a:r>
           </a:p>
         </p:txBody>
@@ -5892,366 +6528,88 @@
       </p:grpSpPr>
       <p:sp>
         <p:nvSpPr>
-          <p:cNvPr id="4" name="Text Placeholder 3">
-            <a:extLst>
-              <a:ext uri="{FF2B5EF4-FFF2-40B4-BE49-F238E27FC236}">
-                <a16:creationId xmlns:a16="http://schemas.microsoft.com/office/drawing/2014/main" id="{898BA411-2A54-A94A-B3FC-826281DBEADF}"/>
-              </a:ext>
-            </a:extLst>
-          </p:cNvPr>
-          <p:cNvSpPr>
-            <a:spLocks noGrp="1"/>
-          </p:cNvSpPr>
-          <p:nvPr>
-            <p:ph idx="2" sz="half" type="body"/>
-          </p:nvPr>
-        </p:nvSpPr>
-        <p:spPr/>
-        <p:txBody>
-          <a:bodyPr/>
-          <a:lstStyle/>
-          <a:p>
-            <a:pPr lvl="0" indent="0" marL="0">
-              <a:spcBef>
-                <a:spcPts val="3000"/>
-              </a:spcBef>
-              <a:buNone/>
-            </a:pPr>
-            <a:r>
-              <a:rPr b="1"/>
-              <a:t>Callouts</a:t>
-            </a:r>
-          </a:p>
-          <a:p>
-            <a:pPr lvl="0" indent="0" marL="0">
-              <a:spcBef>
-                <a:spcPts val="3000"/>
-              </a:spcBef>
-              <a:buNone/>
-            </a:pPr>
-            <a:r>
-              <a:rPr b="1"/>
-              <a:t>Note Callouts</a:t>
-            </a:r>
-          </a:p>
-          <a:p>
-            <a:pPr lvl="0" indent="0" marL="1270000">
-              <a:buNone/>
-            </a:pPr>
-            <a:r>
-              <a:rPr sz="2000" b="1"/>
-              <a:t>Note default</a:t>
-            </a:r>
-          </a:p>
-          <a:p>
-            <a:pPr lvl="0" indent="0" marL="1270000">
-              <a:buNone/>
-            </a:pPr>
-            <a:r>
-              <a:rPr sz="2000"/>
-              <a:t>content</a:t>
-            </a:r>
-          </a:p>
-          <a:p>
-            <a:pPr lvl="0" indent="0" marL="0">
-              <a:spcBef>
-                <a:spcPts val="3000"/>
-              </a:spcBef>
-              <a:buNone/>
-            </a:pPr>
-            <a:r>
-              <a:rPr b="1"/>
-              <a:t>Icons by FontAwesome</a:t>
-            </a:r>
-          </a:p>
-          <a:p>
-            <a:pPr lvl="0" indent="0" marL="0">
-              <a:buNone/>
-            </a:pPr>
-            <a:r>
-              <a:rPr/>
-              <a:t>These are cool  but they do need a full render e.g. </a:t>
-            </a:r>
-            <a:r>
-              <a:rPr>
-                <a:latin typeface="Courier"/>
-              </a:rPr>
-              <a:t>$ quarto render</a:t>
-            </a:r>
-            <a:r>
-              <a:rPr/>
-              <a:t> in order to be seen.</a:t>
-            </a:r>
-          </a:p>
-          <a:p>
-            <a:pPr lvl="0" indent="0" marL="0">
-              <a:buNone/>
-            </a:pPr>
-            <a:r>
-              <a:rPr/>
-              <a:t>They can also be used in pdfs</a:t>
-            </a:r>
-          </a:p>
-        </p:txBody>
-      </p:sp>
-      <p:graphicFrame>
-        <p:nvGraphicFramePr>
-          <p:cNvPr id="6" name="Content Placeholder 5"/>
-          <p:cNvGraphicFramePr>
-            <a:graphicFrameLocks noGrp="1"/>
-          </p:cNvGraphicFramePr>
-          <p:nvPr>
-            <p:ph idx="1"/>
-          </p:nvPr>
-        </p:nvGraphicFramePr>
-        <p:xfrm>
-          <a:off x="5181600" y="977900"/>
-          <a:ext cx="6172200" cy="4356100"/>
-        </p:xfrm>
-        <a:graphic>
-          <a:graphicData uri="http://schemas.openxmlformats.org/drawingml/2006/table">
-            <a:tbl>
-              <a:tblPr firstRow="1" bandRow="1">
-                <a:tableStyleId>{5C22544A-7EE6-4342-B048-85BDC9FD1C3A}</a:tableStyleId>
-              </a:tblPr>
-              <a:tblGrid>
-                <a:gridCol w="3086100"/>
-                <a:gridCol w="3086100"/>
-              </a:tblGrid>
-              <a:tr h="0">
-                <a:tc>
-                  <a:txBody>
-                    <a:bodyPr/>
-                    <a:lstStyle/>
-                    <a:p>
-                      <a:pPr lvl="0" indent="0" marL="0" algn="l">
-                        <a:buNone/>
-                      </a:pPr>
-                      <a:r>
-                        <a:rPr/>
-                        <a:t>input</a:t>
-                      </a:r>
-                    </a:p>
-                  </a:txBody>
-                  <a:tcPr/>
-                </a:tc>
-                <a:tc>
-                  <a:txBody>
-                    <a:bodyPr/>
-                    <a:lstStyle/>
-                    <a:p>
-                      <a:pPr lvl="0" indent="0" marL="0" algn="ctr">
-                        <a:buNone/>
-                      </a:pPr>
-                      <a:r>
-                        <a:rPr/>
-                        <a:t>output</a:t>
-                      </a:r>
-                    </a:p>
-                  </a:txBody>
-                  <a:tcPr/>
-                </a:tc>
-              </a:tr>
-              <a:tr h="0">
-                <a:tc>
-                  <a:txBody>
-                    <a:bodyPr/>
-                    <a:lstStyle/>
-                    <a:p>
-                      <a:pPr lvl="0" indent="0" marL="0" algn="l">
-                        <a:buNone/>
-                      </a:pPr>
-                      <a:r>
-                        <a:rPr>
-                          <a:latin typeface="Courier"/>
-                        </a:rPr>
-                        <a:t>{{&lt; fa binoculars &gt;}}</a:t>
-                      </a:r>
-                    </a:p>
-                  </a:txBody>
-                </a:tc>
-                <a:tc>
-                  <a:txBody>
-                    <a:bodyPr/>
-                    <a:lstStyle/>
-                    <a:p>
-                      <a:pPr lvl="0" indent="0" marL="0" algn="ctr">
-                        <a:buNone/>
-                      </a:pPr>
-                      <a:r>
-                        <a:rPr/>
-                        <a:t> Prepare</a:t>
-                      </a:r>
-                    </a:p>
-                  </a:txBody>
-                </a:tc>
-              </a:tr>
-              <a:tr h="0">
-                <a:tc>
-                  <a:txBody>
-                    <a:bodyPr/>
-                    <a:lstStyle/>
-                    <a:p>
-                      <a:pPr lvl="0" indent="0" marL="0" algn="l">
-                        <a:buNone/>
-                      </a:pPr>
-                      <a:r>
-                        <a:rPr>
-                          <a:latin typeface="Courier"/>
-                        </a:rPr>
-                        <a:t>{{&lt; fa chalkboard-teacher &gt;}}</a:t>
-                      </a:r>
-                    </a:p>
-                  </a:txBody>
-                </a:tc>
-                <a:tc>
-                  <a:txBody>
-                    <a:bodyPr/>
-                    <a:lstStyle/>
-                    <a:p>
-                      <a:pPr lvl="0" indent="0" marL="0" algn="ctr">
-                        <a:buNone/>
-                      </a:pPr>
-                      <a:r>
-                        <a:rPr/>
-                        <a:t> Lecture</a:t>
-                      </a:r>
-                    </a:p>
-                  </a:txBody>
-                </a:tc>
-              </a:tr>
-              <a:tr h="0">
-                <a:tc>
-                  <a:txBody>
-                    <a:bodyPr/>
-                    <a:lstStyle/>
-                    <a:p>
-                      <a:pPr lvl="0" indent="0" marL="0" algn="l">
-                        <a:buNone/>
-                      </a:pPr>
-                      <a:r>
-                        <a:rPr>
-                          <a:latin typeface="Courier"/>
-                        </a:rPr>
-                        <a:t>{{&lt; fa users &gt;}}</a:t>
-                      </a:r>
-                    </a:p>
-                  </a:txBody>
-                </a:tc>
-                <a:tc>
-                  <a:txBody>
-                    <a:bodyPr/>
-                    <a:lstStyle/>
-                    <a:p>
-                      <a:pPr lvl="0" indent="0" marL="0" algn="ctr">
-                        <a:buNone/>
-                      </a:pPr>
-                      <a:r>
-                        <a:rPr/>
-                        <a:t> Lab</a:t>
-                      </a:r>
-                    </a:p>
-                  </a:txBody>
-                </a:tc>
-              </a:tr>
-              <a:tr h="0">
-                <a:tc>
-                  <a:txBody>
-                    <a:bodyPr/>
-                    <a:lstStyle/>
-                    <a:p>
-                      <a:pPr lvl="0" indent="0" marL="0" algn="l">
-                        <a:buNone/>
-                      </a:pPr>
-                      <a:r>
-                        <a:rPr>
-                          <a:latin typeface="Courier"/>
-                        </a:rPr>
-                        <a:t>{{&lt; fa bookmark &gt;}}</a:t>
-                      </a:r>
-                    </a:p>
-                  </a:txBody>
-                </a:tc>
-                <a:tc>
-                  <a:txBody>
-                    <a:bodyPr/>
-                    <a:lstStyle/>
-                    <a:p>
-                      <a:pPr lvl="0" indent="0" marL="0" algn="ctr">
-                        <a:buNone/>
-                      </a:pPr>
-                      <a:r>
-                        <a:rPr/>
-                        <a:t> Reading</a:t>
-                      </a:r>
-                    </a:p>
-                  </a:txBody>
-                </a:tc>
-              </a:tr>
-              <a:tr h="0">
-                <a:tc>
-                  <a:txBody>
-                    <a:bodyPr/>
-                    <a:lstStyle/>
-                    <a:p>
-                      <a:pPr lvl="0" indent="0" marL="0" algn="l">
-                        <a:buNone/>
-                      </a:pPr>
-                      <a:r>
-                        <a:rPr>
-                          <a:latin typeface="Courier"/>
-                        </a:rPr>
-                        <a:t>{{&lt; fa book &gt;}}</a:t>
-                      </a:r>
-                    </a:p>
-                  </a:txBody>
-                </a:tc>
-                <a:tc>
-                  <a:txBody>
-                    <a:bodyPr/>
-                    <a:lstStyle/>
-                    <a:p>
-                      <a:pPr lvl="0" indent="0" marL="0" algn="ctr">
-                        <a:buNone/>
-                      </a:pPr>
-                      <a:r>
-                        <a:rPr/>
-                        <a:t> Mini-Dissertation</a:t>
-                      </a:r>
-                    </a:p>
-                  </a:txBody>
-                </a:tc>
-              </a:tr>
-            </a:tbl>
-          </a:graphicData>
-        </a:graphic>
-      </p:graphicFrame>
-      <p:sp>
-        <p:nvSpPr>
-          <p:cNvPr id="1" name="TextBox 3"/>
-          <p:cNvSpPr txBox="1"/>
-          <p:nvPr/>
+          <p:cNvPr id="2" name="Title 1">
+            <a:extLst>
+              <a:ext uri="{FF2B5EF4-FFF2-40B4-BE49-F238E27FC236}">
+                <a16:creationId xmlns:a16="http://schemas.microsoft.com/office/drawing/2014/main" id="{DD9B8E45-0772-954C-8D4B-6E6808DFEDED}"/>
+              </a:ext>
+            </a:extLst>
+          </p:cNvPr>
+          <p:cNvSpPr>
+            <a:spLocks noGrp="1"/>
+          </p:cNvSpPr>
+          <p:nvPr>
+            <p:ph type="title"/>
+          </p:nvPr>
         </p:nvSpPr>
         <p:spPr>
           <a:xfrm>
-            <a:off x="5181600" y="5334000"/>
-            <a:ext cx="6172200" cy="508000"/>
+            <a:off x="838200" y="365129"/>
+            <a:ext cx="10002520" cy="1325563"/>
           </a:xfrm>
           <a:prstGeom prst="rect">
             <a:avLst/>
           </a:prstGeom>
-          <a:noFill/>
         </p:spPr>
         <p:txBody>
           <a:bodyPr/>
           <a:lstStyle/>
           <a:p>
-            <a:pPr lvl="0" indent="0" marL="0" algn="ctr">
+            <a:pPr lvl="0" indent="0" marL="0">
               <a:buNone/>
             </a:pPr>
             <a:r>
               <a:rPr/>
-              <a:t>Fontawesome</a:t>
+              <a:t>me</a:t>
+            </a:r>
+          </a:p>
+        </p:txBody>
+      </p:sp>
+      <p:sp>
+        <p:nvSpPr>
+          <p:cNvPr id="3" name="Content Placeholder 2">
+            <a:extLst>
+              <a:ext uri="{FF2B5EF4-FFF2-40B4-BE49-F238E27FC236}">
+                <a16:creationId xmlns:a16="http://schemas.microsoft.com/office/drawing/2014/main" id="{A4EB24F9-04F1-C843-9D71-56C5C024552B}"/>
+              </a:ext>
+            </a:extLst>
+          </p:cNvPr>
+          <p:cNvSpPr>
+            <a:spLocks noGrp="1"/>
+          </p:cNvSpPr>
+          <p:nvPr>
+            <p:ph idx="1"/>
+          </p:nvPr>
+        </p:nvSpPr>
+        <p:spPr/>
+        <p:txBody>
+          <a:bodyPr/>
+          <a:lstStyle/>
+          <a:p>
+            <a:pPr lvl="0" indent="0" marL="0">
+              <a:buNone/>
+            </a:pPr>
+            <a:r>
+              <a:rPr/>
+              <a:t>I will be in every Research Methods lecture and I have a Student Hour from 3-4 every Monday, before we all go to the Design &amp; Analysis lecture. Yup! Me too!</a:t>
+            </a:r>
+          </a:p>
+          <a:p>
+            <a:pPr lvl="0" indent="0" marL="0">
+              <a:buNone/>
+            </a:pPr>
+            <a:r>
+              <a:rPr/>
+              <a:t>Available at g.wright@gold.ac.uk</a:t>
+            </a:r>
+          </a:p>
+          <a:p>
+            <a:pPr lvl="0" indent="0" marL="0">
+              <a:buNone/>
+            </a:pPr>
+            <a:r>
+              <a:rPr/>
+              <a:t>I genuinely could not imagine anything I would rather do that this. Please talk to me!</a:t>
             </a:r>
           </a:p>
         </p:txBody>
@@ -6312,7 +6670,7 @@
             </a:pPr>
             <a:r>
               <a:rPr/>
-              <a:t>Induction Overview</a:t>
+              <a:t>Module weighting and assessment</a:t>
             </a:r>
           </a:p>
         </p:txBody>
@@ -6339,14 +6697,11 @@
           <a:lstStyle/>
           <a:p>
             <a:pPr lvl="0" indent="0" marL="0">
-              <a:spcBef>
-                <a:spcPts val="3000"/>
-              </a:spcBef>
               <a:buNone/>
             </a:pPr>
             <a:r>
-              <a:rPr b="1"/>
-              <a:t>Welcome back and welcome to Research Methods!</a:t>
+              <a:rPr/>
+              <a:t>Research Methods is a core module with a 30 credit weighting</a:t>
             </a:r>
           </a:p>
           <a:p>
@@ -6355,602 +6710,28 @@
             </a:pPr>
             <a:r>
               <a:rPr/>
-              <a:t>here is some content</a:t>
-            </a:r>
-          </a:p>
-          <a:p>
-            <a:pPr lvl="0" indent="0" marL="0">
-              <a:spcBef>
-                <a:spcPts val="3000"/>
-              </a:spcBef>
-              <a:buNone/>
-            </a:pPr>
-            <a:r>
-              <a:rPr b="1"/>
-              <a:t>This year you become Scientists!</a:t>
-            </a:r>
-          </a:p>
-          <a:p>
-            <a:pPr lvl="0" indent="0" marL="0">
-              <a:buNone/>
-            </a:pPr>
-            <a:r>
-              <a:rPr/>
-              <a:t>This year, in Research Methods, you will perform your first piece of REAL psychological research</a:t>
-            </a:r>
-          </a:p>
-          <a:p>
-            <a:pPr lvl="0" indent="0" marL="0">
-              <a:buNone/>
-            </a:pPr>
-            <a:r>
-              <a:rPr/>
-              <a:t>In groups, you will:</a:t>
+              <a:t>This means that in order to progress to Y3, you must pass all 3 assessment elements:</a:t>
             </a:r>
           </a:p>
           <a:p>
             <a:pPr lvl="0"/>
             <a:r>
               <a:rPr/>
-              <a:t>Identify an area of psychological research</a:t>
+              <a:t>Critical Proposal 1,800 words (15%)</a:t>
             </a:r>
           </a:p>
           <a:p>
             <a:pPr lvl="0"/>
             <a:r>
               <a:rPr/>
-              <a:t>Review and critique the literature in this area</a:t>
+              <a:t>Mini-Dissertation 2,500 words (70%)</a:t>
             </a:r>
           </a:p>
           <a:p>
             <a:pPr lvl="0"/>
             <a:r>
               <a:rPr/>
-              <a:t>Develop a testable hypothesis</a:t>
-            </a:r>
-          </a:p>
-          <a:p>
-            <a:pPr lvl="0"/>
-            <a:r>
-              <a:rPr/>
-              <a:t>Design a 2x2 ANOVA experiment unique to you (within your group design)</a:t>
-            </a:r>
-          </a:p>
-          <a:p>
-            <a:pPr lvl="0"/>
-            <a:r>
-              <a:rPr/>
-              <a:t>Obtain Ethical Approval for your experiment</a:t>
-            </a:r>
-          </a:p>
-          <a:p>
-            <a:pPr lvl="0"/>
-            <a:r>
-              <a:rPr/>
-              <a:t>Collect REAL data</a:t>
-            </a:r>
-          </a:p>
-          <a:p>
-            <a:pPr lvl="0"/>
-            <a:r>
-              <a:rPr/>
-              <a:t>Analyse these data</a:t>
-            </a:r>
-          </a:p>
-          <a:p>
-            <a:pPr lvl="0"/>
-            <a:r>
-              <a:rPr/>
-              <a:t>Write up the results in APA format</a:t>
-            </a:r>
-          </a:p>
-          <a:p>
-            <a:pPr lvl="0" indent="0" marL="0">
-              <a:spcBef>
-                <a:spcPts val="3000"/>
-              </a:spcBef>
-              <a:buNone/>
-            </a:pPr>
-            <a:r>
-              <a:rPr b="1"/>
-              <a:t>A full overview will be given in the first lecture!</a:t>
-            </a:r>
-          </a:p>
-          <a:p>
-            <a:pPr lvl="0" indent="0" marL="0">
-              <a:buNone/>
-            </a:pPr>
-            <a:r>
-              <a:rPr/>
-              <a:t>Do not worry! It’s going to be a great adventure!</a:t>
-            </a:r>
-          </a:p>
-          <a:p>
-            <a:pPr lvl="0" indent="0" marL="0">
-              <a:spcBef>
-                <a:spcPts val="3000"/>
-              </a:spcBef>
-              <a:buNone/>
-            </a:pPr>
-            <a:r>
-              <a:rPr b="1"/>
-              <a:t>A ‘warm up’ for your Y3 Dissertation</a:t>
-            </a:r>
-          </a:p>
-          <a:p>
-            <a:pPr lvl="0"/>
-            <a:r>
-              <a:rPr/>
-              <a:t>The same 20-week timeline</a:t>
-            </a:r>
-          </a:p>
-          <a:p>
-            <a:pPr lvl="0"/>
-            <a:r>
-              <a:rPr/>
-              <a:t>The same skills and techniques you will need</a:t>
-            </a:r>
-          </a:p>
-          <a:p>
-            <a:pPr lvl="0"/>
-            <a:r>
-              <a:rPr/>
-              <a:t>Careful step-by-step guidance and support in the lab setting</a:t>
-            </a:r>
-          </a:p>
-          <a:p>
-            <a:pPr lvl="0"/>
-            <a:r>
-              <a:rPr/>
-              <a:t>Scaled-down experiments and write-ups</a:t>
-            </a:r>
-          </a:p>
-          <a:p>
-            <a:pPr lvl="0"/>
-            <a:r>
-              <a:rPr/>
-              <a:t>The security of working in a group</a:t>
-            </a:r>
-          </a:p>
-          <a:p>
-            <a:pPr lvl="0"/>
-            <a:r>
-              <a:rPr/>
-              <a:t>Tips and advice from world-class researchers</a:t>
-            </a:r>
-          </a:p>
-          <a:p>
-            <a:pPr lvl="0"/>
-            <a:r>
-              <a:rPr/>
-              <a:t>Opportunity to think carefully about your final year Dissertation, and how to crush it!!</a:t>
-            </a:r>
-          </a:p>
-          <a:p>
-            <a:pPr lvl="0" indent="0" marL="0">
-              <a:spcBef>
-                <a:spcPts val="3000"/>
-              </a:spcBef>
-              <a:buNone/>
-            </a:pPr>
-            <a:r>
-              <a:rPr b="1"/>
-              <a:t>Support and guidance</a:t>
-            </a:r>
-          </a:p>
-          <a:p>
-            <a:pPr lvl="0"/>
-            <a:r>
-              <a:rPr/>
-              <a:t>Gordon Wright (Module Coordinator and floating Enthusiast in Chief)</a:t>
-            </a:r>
-          </a:p>
-          <a:p>
-            <a:pPr lvl="0"/>
-            <a:r>
-              <a:rPr/>
-              <a:t>7 gobsmackingly amazing Lab Tutors</a:t>
-            </a:r>
-          </a:p>
-          <a:p>
-            <a:pPr lvl="0"/>
-            <a:r>
-              <a:rPr/>
-              <a:t>Your Personal Tutor and your PT group</a:t>
-            </a:r>
-          </a:p>
-          <a:p>
-            <a:pPr lvl="0"/>
-            <a:r>
-              <a:rPr/>
-              <a:t>AND EACH OTHER!!</a:t>
-            </a:r>
-          </a:p>
-          <a:p>
-            <a:pPr lvl="0" indent="0" marL="0">
-              <a:buNone/>
-            </a:pPr>
-            <a:r>
-              <a:rPr/>
-              <a:t>This is a team-sport</a:t>
-            </a:r>
-          </a:p>
-          <a:p>
-            <a:pPr lvl="0" indent="0" marL="0">
-              <a:spcBef>
-                <a:spcPts val="3000"/>
-              </a:spcBef>
-              <a:buNone/>
-            </a:pPr>
-            <a:r>
-              <a:rPr b="1"/>
-              <a:t>me</a:t>
-            </a:r>
-          </a:p>
-          <a:p>
-            <a:pPr lvl="0" indent="0" marL="0">
-              <a:buNone/>
-            </a:pPr>
-            <a:r>
-              <a:rPr/>
-              <a:t>I will be in every Research Methods lecture and I have a Student Hour from 3-4 every Monday, before we all go to the Design &amp; Analysis lecture. Yup! Me too!</a:t>
-            </a:r>
-          </a:p>
-          <a:p>
-            <a:pPr lvl="0" indent="0" marL="0">
-              <a:buNone/>
-            </a:pPr>
-            <a:r>
-              <a:rPr/>
-              <a:t>Available at g.wright@gold.ac.uk</a:t>
-            </a:r>
-          </a:p>
-          <a:p>
-            <a:pPr lvl="0" indent="0" marL="0">
-              <a:buNone/>
-            </a:pPr>
-            <a:r>
-              <a:rPr/>
-              <a:t>I genuinely could not imagine anything I would rather do than this. Please talk to me! Help me get to know you!</a:t>
-            </a:r>
-          </a:p>
-          <a:p>
-            <a:pPr lvl="0" indent="0" marL="0">
-              <a:spcBef>
-                <a:spcPts val="3000"/>
-              </a:spcBef>
-              <a:buNone/>
-            </a:pPr>
-            <a:r>
-              <a:rPr b="1"/>
-              <a:t>Module weighting and assessment</a:t>
-            </a:r>
-          </a:p>
-          <a:p>
-            <a:pPr lvl="0" indent="0" marL="0">
-              <a:buNone/>
-            </a:pPr>
-            <a:r>
-              <a:rPr/>
-              <a:t>Research Methods is a core module with a 30 credit weighting</a:t>
-            </a:r>
-          </a:p>
-          <a:p>
-            <a:pPr lvl="0" indent="0" marL="0">
-              <a:buNone/>
-            </a:pPr>
-            <a:r>
-              <a:rPr/>
-              <a:t>This means that in order to progress to Y3, you must pass all 3 assessment elements:</a:t>
-            </a:r>
-          </a:p>
-          <a:p>
-            <a:pPr lvl="0"/>
-            <a:r>
-              <a:rPr/>
-              <a:t>Critical Proposal 1,800 words (15%)</a:t>
-            </a:r>
-          </a:p>
-          <a:p>
-            <a:pPr lvl="0"/>
-            <a:r>
-              <a:rPr/>
-              <a:t>Mini-Dissertation 2,500 words (70%)</a:t>
-            </a:r>
-          </a:p>
-          <a:p>
-            <a:pPr lvl="0"/>
-            <a:r>
-              <a:rPr/>
               <a:t>CHIP Learning Log 1,200 words (15%)</a:t>
-            </a:r>
-          </a:p>
-          <a:p>
-            <a:pPr lvl="0" indent="0" marL="0">
-              <a:spcBef>
-                <a:spcPts val="3000"/>
-              </a:spcBef>
-              <a:buNone/>
-            </a:pPr>
-            <a:r>
-              <a:rPr b="1"/>
-              <a:t>A friendly warning</a:t>
-            </a:r>
-          </a:p>
-          <a:p>
-            <a:pPr lvl="0" indent="0" marL="1270000">
-              <a:buNone/>
-            </a:pPr>
-            <a:r>
-              <a:rPr sz="2000" b="1"/>
-              <a:t>Warning</a:t>
-            </a:r>
-          </a:p>
-          <a:p>
-            <a:pPr lvl="0" indent="0" marL="1270000">
-              <a:buNone/>
-            </a:pPr>
-            <a:r>
-              <a:rPr sz="2000"/>
-              <a:t>All coursework is INDIVIDUAL and subject to normal plagiarism and collusion rules</a:t>
-            </a:r>
-          </a:p>
-          <a:p>
-            <a:pPr lvl="0" indent="0" marL="0">
-              <a:spcBef>
-                <a:spcPts val="3000"/>
-              </a:spcBef>
-              <a:buNone/>
-            </a:pPr>
-            <a:r>
-              <a:rPr b="1"/>
-              <a:t>Module structure</a:t>
-            </a:r>
-          </a:p>
-          <a:p>
-            <a:pPr lvl="0" indent="0" marL="0">
-              <a:buNone/>
-            </a:pPr>
-            <a:r>
-              <a:rPr/>
-              <a:t>1 x 1 hr Lecture per week (Monday)</a:t>
-            </a:r>
-          </a:p>
-          <a:p>
-            <a:pPr lvl="0" indent="0" marL="0">
-              <a:buNone/>
-            </a:pPr>
-            <a:r>
-              <a:rPr/>
-              <a:t>1 x 2 hr Lab per week (Tuesday)</a:t>
-            </a:r>
-          </a:p>
-          <a:p>
-            <a:pPr lvl="0" indent="0" marL="0">
-              <a:buNone/>
-            </a:pPr>
-            <a:r>
-              <a:rPr/>
-              <a:t>4 x Personal Tutor meetings across the year</a:t>
-            </a:r>
-          </a:p>
-          <a:p>
-            <a:pPr lvl="0" indent="0" marL="0">
-              <a:spcBef>
-                <a:spcPts val="3000"/>
-              </a:spcBef>
-              <a:buNone/>
-            </a:pPr>
-            <a:r>
-              <a:rPr b="1"/>
-              <a:t>Weekly Structure</a:t>
-            </a:r>
-          </a:p>
-          <a:p>
-            <a:pPr lvl="0" indent="0" marL="0">
-              <a:buNone/>
-            </a:pPr>
-            <a:r>
-              <a:rPr/>
-              <a:t>Each week there will be a very brief ‘</a:t>
-            </a:r>
-            <a:r>
-              <a:rPr b="1"/>
-              <a:t>Preparation</a:t>
-            </a:r>
-            <a:r>
-              <a:rPr/>
-              <a:t>’ designed to introduce the main topics of the week</a:t>
-            </a:r>
-          </a:p>
-          <a:p>
-            <a:pPr lvl="0" indent="0" marL="0">
-              <a:buNone/>
-            </a:pPr>
-            <a:r>
-              <a:rPr b="1"/>
-              <a:t>Lecture</a:t>
-            </a:r>
-            <a:r>
-              <a:rPr/>
-              <a:t> (slides a week ahead and recording posted afterwards)</a:t>
-            </a:r>
-          </a:p>
-          <a:p>
-            <a:pPr lvl="0" indent="0" marL="0">
-              <a:buNone/>
-            </a:pPr>
-            <a:r>
-              <a:rPr b="1"/>
-              <a:t>Labs</a:t>
-            </a:r>
-          </a:p>
-          <a:p>
-            <a:pPr lvl="0"/>
-            <a:r>
-              <a:rPr/>
-              <a:t>Broad structure, but for you to use to advantage</a:t>
-            </a:r>
-          </a:p>
-          <a:p>
-            <a:pPr lvl="0"/>
-            <a:r>
-              <a:rPr/>
-              <a:t>Attendance QR code up for 15 minutes, and the first 15 minutes is for you to get yourself sorted out as a group</a:t>
-            </a:r>
-          </a:p>
-          <a:p>
-            <a:pPr lvl="0"/>
-            <a:r>
-              <a:rPr/>
-              <a:t>Your Lab Tutor will give a 10-15 minute overview of what you could be doing, and a survey of the resources/materials provided</a:t>
-            </a:r>
-          </a:p>
-          <a:p>
-            <a:pPr lvl="0"/>
-            <a:r>
-              <a:rPr/>
-              <a:t>If you need support, make yourself known as your Lab Tutor (or I) tour the lab(s)</a:t>
-            </a:r>
-          </a:p>
-          <a:p>
-            <a:pPr lvl="0"/>
-            <a:r>
-              <a:rPr/>
-              <a:t>You can (and should) ask any questions that occur to you. The labs are for this purpose. Your Lab Tutor will not be responding to emails outside of lab sessions</a:t>
-            </a:r>
-          </a:p>
-          <a:p>
-            <a:pPr lvl="0"/>
-            <a:r>
-              <a:rPr/>
-              <a:t>Lots can be achieved in the labs, but independent study and coordinated group work will be required</a:t>
-            </a:r>
-          </a:p>
-          <a:p>
-            <a:pPr lvl="0" indent="0" marL="0">
-              <a:buNone/>
-            </a:pPr>
-            <a:r>
-              <a:rPr/>
-              <a:t>NO EXAM</a:t>
-            </a:r>
-          </a:p>
-          <a:p>
-            <a:pPr lvl="0" indent="0" marL="0">
-              <a:spcBef>
-                <a:spcPts val="3000"/>
-              </a:spcBef>
-              <a:buNone/>
-            </a:pPr>
-            <a:r>
-              <a:rPr b="1"/>
-              <a:t>Coursework</a:t>
-            </a:r>
-          </a:p>
-          <a:p>
-            <a:pPr lvl="0" indent="0" marL="0">
-              <a:buNone/>
-            </a:pPr>
-            <a:r>
-              <a:rPr/>
-              <a:t>The courseworks ALL require critical reflection and metacognitive practice. This will be discussed in a number of lectures, but it contributes to effective learning and your integration of the skills and experience of doing this research exercise.</a:t>
-            </a:r>
-          </a:p>
-          <a:p>
-            <a:pPr lvl="0" indent="0" marL="0">
-              <a:spcBef>
-                <a:spcPts val="3000"/>
-              </a:spcBef>
-              <a:buNone/>
-            </a:pPr>
-            <a:r>
-              <a:rPr b="1"/>
-              <a:t>Time management and teamwork</a:t>
-            </a:r>
-          </a:p>
-          <a:p>
-            <a:pPr lvl="0" indent="0" marL="0">
-              <a:buNone/>
-            </a:pPr>
-            <a:r>
-              <a:rPr/>
-              <a:t>..will both be required.</a:t>
-            </a:r>
-          </a:p>
-          <a:p>
-            <a:pPr lvl="0" indent="0" marL="0">
-              <a:buNone/>
-            </a:pPr>
-            <a:r>
-              <a:rPr/>
-              <a:t>I ask you to see both as an opportunity to develop these important skills.</a:t>
-            </a:r>
-          </a:p>
-          <a:p>
-            <a:pPr lvl="0" indent="0" marL="0">
-              <a:buNone/>
-            </a:pPr>
-            <a:r>
-              <a:rPr/>
-              <a:t>You will see we have some ideas to make this more relevant to careers and employability</a:t>
-            </a:r>
-          </a:p>
-          <a:p>
-            <a:pPr lvl="0" indent="0" marL="0">
-              <a:buNone/>
-            </a:pPr>
-            <a:r>
-              <a:rPr/>
-              <a:t>It is easier to ‘keep up than to catch up’.</a:t>
-            </a:r>
-          </a:p>
-          <a:p>
-            <a:pPr lvl="0" indent="0" marL="0">
-              <a:spcBef>
-                <a:spcPts val="3000"/>
-              </a:spcBef>
-              <a:buNone/>
-            </a:pPr>
-            <a:r>
-              <a:rPr b="1"/>
-              <a:t>Resources</a:t>
-            </a:r>
-          </a:p>
-          <a:p>
-            <a:pPr lvl="0" indent="0" marL="0">
-              <a:buNone/>
-            </a:pPr>
-            <a:r>
-              <a:rPr/>
-              <a:t>We will be releasing a series of valuable resources to help you through every step of the process</a:t>
-            </a:r>
-          </a:p>
-          <a:p>
-            <a:pPr lvl="0" indent="0" marL="0">
-              <a:buNone/>
-            </a:pPr>
-            <a:r>
-              <a:rPr/>
-              <a:t>These will have value for your final year dissertation too.</a:t>
-            </a:r>
-          </a:p>
-          <a:p>
-            <a:pPr lvl="0" indent="0" marL="0">
-              <a:buNone/>
-            </a:pPr>
-            <a:r>
-              <a:rPr/>
-              <a:t>Contribution to and comment on these is welcome and hoped for!</a:t>
-            </a:r>
-          </a:p>
-          <a:p>
-            <a:pPr lvl="0" indent="0" marL="0">
-              <a:buNone/>
-            </a:pPr>
-            <a:r>
-              <a:rPr/>
-              <a:t>Open Educational Resources will be used extensively, and most core readings are available online via the library.</a:t>
             </a:r>
           </a:p>
         </p:txBody>

</xml_diff>